<commit_message>
Updated Figure2 caption; Moved old abstract version to ./writing/old folder.
</commit_message>
<xml_diff>
--- a/presentation/OHBM2020/Figure2.pptx
+++ b/presentation/OHBM2020/Figure2.pptx
@@ -243,7 +243,7 @@
           <a:p>
             <a:fld id="{F045DC2F-CA7A-4CB6-B602-7655BF814A46}" type="datetimeFigureOut">
               <a:rPr lang="en-US" smtClean="0"/>
-              <a:t>12/19/2019</a:t>
+              <a:t>12/19/19</a:t>
             </a:fld>
             <a:endParaRPr lang="en-US"/>
           </a:p>
@@ -413,7 +413,7 @@
           <a:p>
             <a:fld id="{F045DC2F-CA7A-4CB6-B602-7655BF814A46}" type="datetimeFigureOut">
               <a:rPr lang="en-US" smtClean="0"/>
-              <a:t>12/19/2019</a:t>
+              <a:t>12/19/19</a:t>
             </a:fld>
             <a:endParaRPr lang="en-US"/>
           </a:p>
@@ -593,7 +593,7 @@
           <a:p>
             <a:fld id="{F045DC2F-CA7A-4CB6-B602-7655BF814A46}" type="datetimeFigureOut">
               <a:rPr lang="en-US" smtClean="0"/>
-              <a:t>12/19/2019</a:t>
+              <a:t>12/19/19</a:t>
             </a:fld>
             <a:endParaRPr lang="en-US"/>
           </a:p>
@@ -763,7 +763,7 @@
           <a:p>
             <a:fld id="{F045DC2F-CA7A-4CB6-B602-7655BF814A46}" type="datetimeFigureOut">
               <a:rPr lang="en-US" smtClean="0"/>
-              <a:t>12/19/2019</a:t>
+              <a:t>12/19/19</a:t>
             </a:fld>
             <a:endParaRPr lang="en-US"/>
           </a:p>
@@ -1009,7 +1009,7 @@
           <a:p>
             <a:fld id="{F045DC2F-CA7A-4CB6-B602-7655BF814A46}" type="datetimeFigureOut">
               <a:rPr lang="en-US" smtClean="0"/>
-              <a:t>12/19/2019</a:t>
+              <a:t>12/19/19</a:t>
             </a:fld>
             <a:endParaRPr lang="en-US"/>
           </a:p>
@@ -1241,7 +1241,7 @@
           <a:p>
             <a:fld id="{F045DC2F-CA7A-4CB6-B602-7655BF814A46}" type="datetimeFigureOut">
               <a:rPr lang="en-US" smtClean="0"/>
-              <a:t>12/19/2019</a:t>
+              <a:t>12/19/19</a:t>
             </a:fld>
             <a:endParaRPr lang="en-US"/>
           </a:p>
@@ -1608,7 +1608,7 @@
           <a:p>
             <a:fld id="{F045DC2F-CA7A-4CB6-B602-7655BF814A46}" type="datetimeFigureOut">
               <a:rPr lang="en-US" smtClean="0"/>
-              <a:t>12/19/2019</a:t>
+              <a:t>12/19/19</a:t>
             </a:fld>
             <a:endParaRPr lang="en-US"/>
           </a:p>
@@ -1726,7 +1726,7 @@
           <a:p>
             <a:fld id="{F045DC2F-CA7A-4CB6-B602-7655BF814A46}" type="datetimeFigureOut">
               <a:rPr lang="en-US" smtClean="0"/>
-              <a:t>12/19/2019</a:t>
+              <a:t>12/19/19</a:t>
             </a:fld>
             <a:endParaRPr lang="en-US"/>
           </a:p>
@@ -1821,7 +1821,7 @@
           <a:p>
             <a:fld id="{F045DC2F-CA7A-4CB6-B602-7655BF814A46}" type="datetimeFigureOut">
               <a:rPr lang="en-US" smtClean="0"/>
-              <a:t>12/19/2019</a:t>
+              <a:t>12/19/19</a:t>
             </a:fld>
             <a:endParaRPr lang="en-US"/>
           </a:p>
@@ -2098,7 +2098,7 @@
           <a:p>
             <a:fld id="{F045DC2F-CA7A-4CB6-B602-7655BF814A46}" type="datetimeFigureOut">
               <a:rPr lang="en-US" smtClean="0"/>
-              <a:t>12/19/2019</a:t>
+              <a:t>12/19/19</a:t>
             </a:fld>
             <a:endParaRPr lang="en-US"/>
           </a:p>
@@ -2355,7 +2355,7 @@
           <a:p>
             <a:fld id="{F045DC2F-CA7A-4CB6-B602-7655BF814A46}" type="datetimeFigureOut">
               <a:rPr lang="en-US" smtClean="0"/>
-              <a:t>12/19/2019</a:t>
+              <a:t>12/19/19</a:t>
             </a:fld>
             <a:endParaRPr lang="en-US"/>
           </a:p>
@@ -2568,7 +2568,7 @@
           <a:p>
             <a:fld id="{F045DC2F-CA7A-4CB6-B602-7655BF814A46}" type="datetimeFigureOut">
               <a:rPr lang="en-US" smtClean="0"/>
-              <a:t>12/19/2019</a:t>
+              <a:t>12/19/19</a:t>
             </a:fld>
             <a:endParaRPr lang="en-US"/>
           </a:p>
@@ -3023,8 +3023,8 @@
         </p:nvSpPr>
         <p:spPr>
           <a:xfrm>
-            <a:off x="146715" y="4931926"/>
-            <a:ext cx="14106782" cy="2062103"/>
+            <a:off x="146715" y="4644768"/>
+            <a:ext cx="14106782" cy="2554545"/>
           </a:xfrm>
           <a:prstGeom prst="rect">
             <a:avLst/>
@@ -3038,32 +3038,32 @@
           <a:lstStyle/>
           <a:p>
             <a:r>
+              <a:rPr lang="en-US" sz="1600" b="1" dirty="0">
+                <a:latin typeface="Arial" panose="020B0604020202020204" pitchFamily="34" charset="0"/>
+                <a:cs typeface="Arial" panose="020B0604020202020204" pitchFamily="34" charset="0"/>
+              </a:rPr>
+              <a:t>Fig. 2 – HMFA detects the simulated session effect and identifies the types of edges simulated. </a:t>
+            </a:r>
+            <a:r>
               <a:rPr lang="en-US" sz="1600" dirty="0">
                 <a:latin typeface="Arial" panose="020B0604020202020204" pitchFamily="34" charset="0"/>
                 <a:cs typeface="Arial" panose="020B0604020202020204" pitchFamily="34" charset="0"/>
               </a:rPr>
-              <a:t>(A) The row factor scores from the hierarchical multiple factor analysis (HMFA). The first component distinguishes the simulated (blue dots; Sessions 2 and 4) and non-simulated (purple dots; Sessions 1 and 3) sessions. The small </a:t>
+              <a:t>(A) The biplot shows the row factor scores from the hierarchical multiple factor analysis (HMFA). The first component distinguishes the simulated (blue dots; Sessions 2 and 4) and non-simulated (purple dots; Sessions 1 and 3) sessions. The small diamond dots that extend from each factor score are the partial factor scores which represent how each session is viewed from the perspectives of different tables (i.e., different participants). (B) The </a:t>
             </a:r>
             <a:r>
               <a:rPr lang="en-US" sz="1600" dirty="0" err="1">
                 <a:latin typeface="Arial" panose="020B0604020202020204" pitchFamily="34" charset="0"/>
                 <a:cs typeface="Arial" panose="020B0604020202020204" pitchFamily="34" charset="0"/>
               </a:rPr>
-              <a:t>dimond</a:t>
-            </a:r>
-            <a:r>
-              <a:rPr lang="en-US" sz="1600">
-                <a:latin typeface="Arial" panose="020B0604020202020204" pitchFamily="34" charset="0"/>
-                <a:cs typeface="Arial" panose="020B0604020202020204" pitchFamily="34" charset="0"/>
-              </a:rPr>
-              <a:t> </a:t>
+              <a:t>barplot</a:t>
             </a:r>
             <a:r>
               <a:rPr lang="en-US" sz="1600" dirty="0">
                 <a:latin typeface="Arial" panose="020B0604020202020204" pitchFamily="34" charset="0"/>
                 <a:cs typeface="Arial" panose="020B0604020202020204" pitchFamily="34" charset="0"/>
               </a:rPr>
-              <a:t>dots that extend from each factor score are the partial factor scores which represent how each session is viewed from the perspectives of different tables (i.e., different participants). (B) The mean loadings of all edges that significantly contribute to the first component and drive the session effect. The orange arrows pointing towards the simulated edges (i.e., the functional connectivity within the DMN as well as the functional connectivity between the default mode network (DMN) and the </a:t>
+              <a:t> indicates the mean loadings of all edges that significantly contribute to the first component and drive the session effect. The orange arrows point towards the simulated edges (i.e., the functional connectivity within the default mode network  (DMN) as well as the functional connectivity between the DMN and the </a:t>
             </a:r>
             <a:r>
               <a:rPr lang="en-US" sz="1600" dirty="0" err="1">
@@ -3077,7 +3077,7 @@
                 <a:latin typeface="Arial" panose="020B0604020202020204" pitchFamily="34" charset="0"/>
                 <a:cs typeface="Arial" panose="020B0604020202020204" pitchFamily="34" charset="0"/>
               </a:rPr>
-              <a:t>-parietal network (FPN)). (C) The mean factor scores of all networks from </a:t>
+              <a:t>-parietal network (FPN)). (C) A comparison analysis was conducted using </a:t>
             </a:r>
             <a:r>
               <a:rPr lang="en-US" sz="1600" dirty="0" err="1">
@@ -3091,7 +3091,21 @@
                 <a:latin typeface="Arial" panose="020B0604020202020204" pitchFamily="34" charset="0"/>
                 <a:cs typeface="Arial" panose="020B0604020202020204" pitchFamily="34" charset="0"/>
               </a:rPr>
-              <a:t> with the parcellation based on a shared template. The four round dots that extend from each network factor score are the partial factor scores which represent how each network is viewed from the perspectives of different sessions. Only the partial factor scores of the DMN distinguish the simulated (blue dots) and the non-simulated (purple dots) sessions.</a:t>
+              <a:t> with the parcellation based on a shared template, and this biplot shows the mean factor scores of all networks from </a:t>
+            </a:r>
+            <a:r>
+              <a:rPr lang="en-US" sz="1600" dirty="0" err="1">
+                <a:latin typeface="Arial" panose="020B0604020202020204" pitchFamily="34" charset="0"/>
+                <a:cs typeface="Arial" panose="020B0604020202020204" pitchFamily="34" charset="0"/>
+              </a:rPr>
+              <a:t>DiSTATIS</a:t>
+            </a:r>
+            <a:r>
+              <a:rPr lang="en-US" sz="1600" dirty="0">
+                <a:latin typeface="Arial" panose="020B0604020202020204" pitchFamily="34" charset="0"/>
+                <a:cs typeface="Arial" panose="020B0604020202020204" pitchFamily="34" charset="0"/>
+              </a:rPr>
+              <a:t> (colored triangle dots). The four round dots that extend from each network factor score are the partial factor scores which represent how each network is viewed from the perspectives of different sessions. Only the partial factor scores of the DMN distinguish the simulated (blue dots) and the non-simulated (purple dots) sessions.</a:t>
             </a:r>
           </a:p>
         </p:txBody>

</xml_diff>

<commit_message>
Update Figure 2 and save the OHBM abstract preprint for the record
</commit_message>
<xml_diff>
--- a/presentation/OHBM2020/Figure2.pptx
+++ b/presentation/OHBM2020/Figure2.pptx
@@ -243,7 +243,7 @@
           <a:p>
             <a:fld id="{F045DC2F-CA7A-4CB6-B602-7655BF814A46}" type="datetimeFigureOut">
               <a:rPr lang="en-US" smtClean="0"/>
-              <a:t>12/19/19</a:t>
+              <a:t>12/20/2019</a:t>
             </a:fld>
             <a:endParaRPr lang="en-US"/>
           </a:p>
@@ -413,7 +413,7 @@
           <a:p>
             <a:fld id="{F045DC2F-CA7A-4CB6-B602-7655BF814A46}" type="datetimeFigureOut">
               <a:rPr lang="en-US" smtClean="0"/>
-              <a:t>12/19/19</a:t>
+              <a:t>12/20/2019</a:t>
             </a:fld>
             <a:endParaRPr lang="en-US"/>
           </a:p>
@@ -593,7 +593,7 @@
           <a:p>
             <a:fld id="{F045DC2F-CA7A-4CB6-B602-7655BF814A46}" type="datetimeFigureOut">
               <a:rPr lang="en-US" smtClean="0"/>
-              <a:t>12/19/19</a:t>
+              <a:t>12/20/2019</a:t>
             </a:fld>
             <a:endParaRPr lang="en-US"/>
           </a:p>
@@ -763,7 +763,7 @@
           <a:p>
             <a:fld id="{F045DC2F-CA7A-4CB6-B602-7655BF814A46}" type="datetimeFigureOut">
               <a:rPr lang="en-US" smtClean="0"/>
-              <a:t>12/19/19</a:t>
+              <a:t>12/20/2019</a:t>
             </a:fld>
             <a:endParaRPr lang="en-US"/>
           </a:p>
@@ -1009,7 +1009,7 @@
           <a:p>
             <a:fld id="{F045DC2F-CA7A-4CB6-B602-7655BF814A46}" type="datetimeFigureOut">
               <a:rPr lang="en-US" smtClean="0"/>
-              <a:t>12/19/19</a:t>
+              <a:t>12/20/2019</a:t>
             </a:fld>
             <a:endParaRPr lang="en-US"/>
           </a:p>
@@ -1241,7 +1241,7 @@
           <a:p>
             <a:fld id="{F045DC2F-CA7A-4CB6-B602-7655BF814A46}" type="datetimeFigureOut">
               <a:rPr lang="en-US" smtClean="0"/>
-              <a:t>12/19/19</a:t>
+              <a:t>12/20/2019</a:t>
             </a:fld>
             <a:endParaRPr lang="en-US"/>
           </a:p>
@@ -1608,7 +1608,7 @@
           <a:p>
             <a:fld id="{F045DC2F-CA7A-4CB6-B602-7655BF814A46}" type="datetimeFigureOut">
               <a:rPr lang="en-US" smtClean="0"/>
-              <a:t>12/19/19</a:t>
+              <a:t>12/20/2019</a:t>
             </a:fld>
             <a:endParaRPr lang="en-US"/>
           </a:p>
@@ -1726,7 +1726,7 @@
           <a:p>
             <a:fld id="{F045DC2F-CA7A-4CB6-B602-7655BF814A46}" type="datetimeFigureOut">
               <a:rPr lang="en-US" smtClean="0"/>
-              <a:t>12/19/19</a:t>
+              <a:t>12/20/2019</a:t>
             </a:fld>
             <a:endParaRPr lang="en-US"/>
           </a:p>
@@ -1821,7 +1821,7 @@
           <a:p>
             <a:fld id="{F045DC2F-CA7A-4CB6-B602-7655BF814A46}" type="datetimeFigureOut">
               <a:rPr lang="en-US" smtClean="0"/>
-              <a:t>12/19/19</a:t>
+              <a:t>12/20/2019</a:t>
             </a:fld>
             <a:endParaRPr lang="en-US"/>
           </a:p>
@@ -2098,7 +2098,7 @@
           <a:p>
             <a:fld id="{F045DC2F-CA7A-4CB6-B602-7655BF814A46}" type="datetimeFigureOut">
               <a:rPr lang="en-US" smtClean="0"/>
-              <a:t>12/19/19</a:t>
+              <a:t>12/20/2019</a:t>
             </a:fld>
             <a:endParaRPr lang="en-US"/>
           </a:p>
@@ -2355,7 +2355,7 @@
           <a:p>
             <a:fld id="{F045DC2F-CA7A-4CB6-B602-7655BF814A46}" type="datetimeFigureOut">
               <a:rPr lang="en-US" smtClean="0"/>
-              <a:t>12/19/19</a:t>
+              <a:t>12/20/2019</a:t>
             </a:fld>
             <a:endParaRPr lang="en-US"/>
           </a:p>
@@ -2568,7 +2568,7 @@
           <a:p>
             <a:fld id="{F045DC2F-CA7A-4CB6-B602-7655BF814A46}" type="datetimeFigureOut">
               <a:rPr lang="en-US" smtClean="0"/>
-              <a:t>12/19/19</a:t>
+              <a:t>12/20/2019</a:t>
             </a:fld>
             <a:endParaRPr lang="en-US"/>
           </a:p>
@@ -3110,6 +3110,186 @@
           </a:p>
         </p:txBody>
       </p:sp>
+      <p:pic>
+        <p:nvPicPr>
+          <p:cNvPr id="3" name="Picture 2">
+            <a:extLst>
+              <a:ext uri="{FF2B5EF4-FFF2-40B4-BE49-F238E27FC236}">
+                <a16:creationId xmlns:a16="http://schemas.microsoft.com/office/drawing/2014/main" id="{A9E65846-1ACB-4F6D-9AD8-424CA512CF98}"/>
+              </a:ext>
+            </a:extLst>
+          </p:cNvPr>
+          <p:cNvPicPr>
+            <a:picLocks noChangeAspect="1"/>
+          </p:cNvPicPr>
+          <p:nvPr/>
+        </p:nvPicPr>
+        <p:blipFill>
+          <a:blip r:embed="rId3">
+            <a:extLst>
+              <a:ext uri="{28A0092B-C50C-407E-A947-70E740481C1C}">
+                <a14:useLocalDpi xmlns:a14="http://schemas.microsoft.com/office/drawing/2010/main" val="0"/>
+              </a:ext>
+            </a:extLst>
+          </a:blip>
+          <a:stretch>
+            <a:fillRect/>
+          </a:stretch>
+        </p:blipFill>
+        <p:spPr>
+          <a:xfrm>
+            <a:off x="0" y="265464"/>
+            <a:ext cx="9599391" cy="4319634"/>
+          </a:xfrm>
+          <a:prstGeom prst="rect">
+            <a:avLst/>
+          </a:prstGeom>
+        </p:spPr>
+      </p:pic>
+      <p:sp>
+        <p:nvSpPr>
+          <p:cNvPr id="9" name="Arrow: Left 8">
+            <a:extLst>
+              <a:ext uri="{FF2B5EF4-FFF2-40B4-BE49-F238E27FC236}">
+                <a16:creationId xmlns:a16="http://schemas.microsoft.com/office/drawing/2014/main" id="{C36266A4-4E97-4626-AAF2-92BD69760F07}"/>
+              </a:ext>
+            </a:extLst>
+          </p:cNvPr>
+          <p:cNvSpPr/>
+          <p:nvPr/>
+        </p:nvSpPr>
+        <p:spPr>
+          <a:xfrm>
+            <a:off x="7684418" y="3696872"/>
+            <a:ext cx="263950" cy="131976"/>
+          </a:xfrm>
+          <a:prstGeom prst="leftArrow">
+            <a:avLst/>
+          </a:prstGeom>
+          <a:solidFill>
+            <a:srgbClr val="F79646"/>
+          </a:solidFill>
+          <a:ln w="12700" cap="flat" cmpd="sng" algn="ctr">
+            <a:solidFill>
+              <a:srgbClr val="F79646">
+                <a:shade val="50000"/>
+              </a:srgbClr>
+            </a:solidFill>
+            <a:prstDash val="solid"/>
+            <a:miter lim="800000"/>
+          </a:ln>
+          <a:effectLst/>
+        </p:spPr>
+        <p:txBody>
+          <a:bodyPr rtlCol="0" anchor="ctr"/>
+          <a:lstStyle/>
+          <a:p>
+            <a:pPr marL="0" marR="0" lvl="0" indent="0" algn="ctr" defTabSz="914400" eaLnBrk="1" fontAlgn="auto" latinLnBrk="0" hangingPunct="1">
+              <a:lnSpc>
+                <a:spcPct val="100000"/>
+              </a:lnSpc>
+              <a:spcBef>
+                <a:spcPts val="0"/>
+              </a:spcBef>
+              <a:spcAft>
+                <a:spcPts val="0"/>
+              </a:spcAft>
+              <a:buClrTx/>
+              <a:buSzTx/>
+              <a:buFontTx/>
+              <a:buNone/>
+              <a:tabLst/>
+              <a:defRPr/>
+            </a:pPr>
+            <a:endParaRPr kumimoji="0" lang="en-US" sz="1800" b="0" i="0" u="none" strike="noStrike" kern="0" cap="none" spc="0" normalizeH="0" baseline="0" noProof="0">
+              <a:ln>
+                <a:noFill/>
+              </a:ln>
+              <a:solidFill>
+                <a:prstClr val="white"/>
+              </a:solidFill>
+              <a:effectLst/>
+              <a:uLnTx/>
+              <a:uFillTx/>
+              <a:latin typeface="Calibri" panose="020F0502020204030204"/>
+              <a:ea typeface="+mn-ea"/>
+              <a:cs typeface="+mn-cs"/>
+            </a:endParaRPr>
+          </a:p>
+        </p:txBody>
+      </p:sp>
+      <p:sp>
+        <p:nvSpPr>
+          <p:cNvPr id="10" name="Arrow: Left 9">
+            <a:extLst>
+              <a:ext uri="{FF2B5EF4-FFF2-40B4-BE49-F238E27FC236}">
+                <a16:creationId xmlns:a16="http://schemas.microsoft.com/office/drawing/2014/main" id="{87BF3906-F2CE-4652-9D06-DC99F9A356B1}"/>
+              </a:ext>
+            </a:extLst>
+          </p:cNvPr>
+          <p:cNvSpPr/>
+          <p:nvPr/>
+        </p:nvSpPr>
+        <p:spPr>
+          <a:xfrm>
+            <a:off x="8416161" y="4131626"/>
+            <a:ext cx="263950" cy="131976"/>
+          </a:xfrm>
+          <a:prstGeom prst="leftArrow">
+            <a:avLst/>
+          </a:prstGeom>
+          <a:solidFill>
+            <a:srgbClr val="F79646"/>
+          </a:solidFill>
+          <a:ln w="12700" cap="flat" cmpd="sng" algn="ctr">
+            <a:solidFill>
+              <a:srgbClr val="F79646">
+                <a:shade val="50000"/>
+              </a:srgbClr>
+            </a:solidFill>
+            <a:prstDash val="solid"/>
+            <a:miter lim="800000"/>
+          </a:ln>
+          <a:effectLst/>
+        </p:spPr>
+        <p:txBody>
+          <a:bodyPr rtlCol="0" anchor="ctr"/>
+          <a:lstStyle/>
+          <a:p>
+            <a:pPr marL="0" marR="0" lvl="0" indent="0" algn="ctr" defTabSz="914400" eaLnBrk="1" fontAlgn="auto" latinLnBrk="0" hangingPunct="1">
+              <a:lnSpc>
+                <a:spcPct val="100000"/>
+              </a:lnSpc>
+              <a:spcBef>
+                <a:spcPts val="0"/>
+              </a:spcBef>
+              <a:spcAft>
+                <a:spcPts val="0"/>
+              </a:spcAft>
+              <a:buClrTx/>
+              <a:buSzTx/>
+              <a:buFontTx/>
+              <a:buNone/>
+              <a:tabLst/>
+              <a:defRPr/>
+            </a:pPr>
+            <a:endParaRPr kumimoji="0" lang="en-US" sz="1800" b="0" i="0" u="none" strike="noStrike" kern="0" cap="none" spc="0" normalizeH="0" baseline="0" noProof="0">
+              <a:ln>
+                <a:noFill/>
+              </a:ln>
+              <a:solidFill>
+                <a:prstClr val="white"/>
+              </a:solidFill>
+              <a:effectLst/>
+              <a:uLnTx/>
+              <a:uFillTx/>
+              <a:latin typeface="Calibri" panose="020F0502020204030204"/>
+              <a:ea typeface="+mn-ea"/>
+              <a:cs typeface="+mn-cs"/>
+            </a:endParaRPr>
+          </a:p>
+        </p:txBody>
+      </p:sp>
     </p:spTree>
     <p:extLst>
       <p:ext uri="{BB962C8B-B14F-4D97-AF65-F5344CB8AC3E}">

</xml_diff>